<commit_message>
Final report addition; result slide is left
</commit_message>
<xml_diff>
--- a/report/final_report.pptx
+++ b/report/final_report.pptx
@@ -70,7 +70,7 @@
         <p:spPr>
           <a:xfrm>
             <a:off x="504000" y="301320"/>
-            <a:ext cx="9071280" cy="1261800"/>
+            <a:ext cx="9072000" cy="1261800"/>
           </a:xfrm>
           <a:prstGeom prst="rect">
             <a:avLst/>
@@ -106,8 +106,8 @@
         </p:nvSpPr>
         <p:spPr>
           <a:xfrm>
-            <a:off x="504000" y="1769040"/>
-            <a:ext cx="9071280" cy="2090880"/>
+            <a:off x="504000" y="1768680"/>
+            <a:ext cx="9072000" cy="2090880"/>
           </a:xfrm>
           <a:prstGeom prst="rect">
             <a:avLst/>
@@ -142,8 +142,8 @@
         </p:nvSpPr>
         <p:spPr>
           <a:xfrm>
-            <a:off x="504000" y="4059000"/>
-            <a:ext cx="9071280" cy="2090880"/>
+            <a:off x="504000" y="4058640"/>
+            <a:ext cx="9072000" cy="2090880"/>
           </a:xfrm>
           <a:prstGeom prst="rect">
             <a:avLst/>
@@ -201,7 +201,7 @@
         <p:spPr>
           <a:xfrm>
             <a:off x="504000" y="301320"/>
-            <a:ext cx="9071280" cy="1261800"/>
+            <a:ext cx="9072000" cy="1261800"/>
           </a:xfrm>
           <a:prstGeom prst="rect">
             <a:avLst/>
@@ -237,8 +237,8 @@
         </p:nvSpPr>
         <p:spPr>
           <a:xfrm>
-            <a:off x="504000" y="1769040"/>
-            <a:ext cx="4426560" cy="2090880"/>
+            <a:off x="504000" y="1768680"/>
+            <a:ext cx="4426920" cy="2090880"/>
           </a:xfrm>
           <a:prstGeom prst="rect">
             <a:avLst/>
@@ -273,8 +273,8 @@
         </p:nvSpPr>
         <p:spPr>
           <a:xfrm>
-            <a:off x="5152320" y="1769040"/>
-            <a:ext cx="4426560" cy="2090880"/>
+            <a:off x="5152680" y="1768680"/>
+            <a:ext cx="4426920" cy="2090880"/>
           </a:xfrm>
           <a:prstGeom prst="rect">
             <a:avLst/>
@@ -309,8 +309,8 @@
         </p:nvSpPr>
         <p:spPr>
           <a:xfrm>
-            <a:off x="5152320" y="4059000"/>
-            <a:ext cx="4426560" cy="2090880"/>
+            <a:off x="5152680" y="4058640"/>
+            <a:ext cx="4426920" cy="2090880"/>
           </a:xfrm>
           <a:prstGeom prst="rect">
             <a:avLst/>
@@ -345,8 +345,8 @@
         </p:nvSpPr>
         <p:spPr>
           <a:xfrm>
-            <a:off x="504000" y="4059000"/>
-            <a:ext cx="4426560" cy="2090880"/>
+            <a:off x="504000" y="4058640"/>
+            <a:ext cx="4426920" cy="2090880"/>
           </a:xfrm>
           <a:prstGeom prst="rect">
             <a:avLst/>
@@ -404,7 +404,7 @@
         <p:spPr>
           <a:xfrm>
             <a:off x="504000" y="301320"/>
-            <a:ext cx="9071280" cy="1261800"/>
+            <a:ext cx="9072000" cy="1261800"/>
           </a:xfrm>
           <a:prstGeom prst="rect">
             <a:avLst/>
@@ -440,8 +440,8 @@
         </p:nvSpPr>
         <p:spPr>
           <a:xfrm>
-            <a:off x="504000" y="1769040"/>
-            <a:ext cx="9071280" cy="4384080"/>
+            <a:off x="504000" y="1768680"/>
+            <a:ext cx="9072000" cy="4384080"/>
           </a:xfrm>
           <a:prstGeom prst="rect">
             <a:avLst/>
@@ -476,8 +476,8 @@
         </p:nvSpPr>
         <p:spPr>
           <a:xfrm>
-            <a:off x="504000" y="1769040"/>
-            <a:ext cx="9071280" cy="4384080"/>
+            <a:off x="504000" y="1768680"/>
+            <a:ext cx="9072000" cy="4384080"/>
           </a:xfrm>
           <a:prstGeom prst="rect">
             <a:avLst/>
@@ -512,7 +512,7 @@
         </p:blipFill>
         <p:spPr>
           <a:xfrm>
-            <a:off x="2292120" y="1769040"/>
+            <a:off x="2292480" y="1768680"/>
             <a:ext cx="5494680" cy="4384080"/>
           </a:xfrm>
           <a:prstGeom prst="rect">
@@ -535,7 +535,7 @@
         </p:blipFill>
         <p:spPr>
           <a:xfrm>
-            <a:off x="2292120" y="1769040"/>
+            <a:off x="2292480" y="1768680"/>
             <a:ext cx="5494680" cy="4384080"/>
           </a:xfrm>
           <a:prstGeom prst="rect">
@@ -603,7 +603,7 @@
         <p:spPr>
           <a:xfrm>
             <a:off x="504000" y="301320"/>
-            <a:ext cx="9071280" cy="1261800"/>
+            <a:ext cx="9072000" cy="1261800"/>
           </a:xfrm>
           <a:prstGeom prst="rect">
             <a:avLst/>
@@ -639,8 +639,8 @@
         </p:nvSpPr>
         <p:spPr>
           <a:xfrm>
-            <a:off x="504000" y="1769040"/>
-            <a:ext cx="9071280" cy="4384080"/>
+            <a:off x="504000" y="1768680"/>
+            <a:ext cx="9072000" cy="4384080"/>
           </a:xfrm>
           <a:prstGeom prst="rect">
             <a:avLst/>
@@ -699,7 +699,7 @@
         <p:spPr>
           <a:xfrm>
             <a:off x="504000" y="301320"/>
-            <a:ext cx="9071280" cy="1261800"/>
+            <a:ext cx="9072000" cy="1261800"/>
           </a:xfrm>
           <a:prstGeom prst="rect">
             <a:avLst/>
@@ -735,8 +735,8 @@
         </p:nvSpPr>
         <p:spPr>
           <a:xfrm>
-            <a:off x="504000" y="1769040"/>
-            <a:ext cx="9071280" cy="4384080"/>
+            <a:off x="504000" y="1768680"/>
+            <a:ext cx="9072000" cy="4384080"/>
           </a:xfrm>
           <a:prstGeom prst="rect">
             <a:avLst/>
@@ -794,7 +794,7 @@
         <p:spPr>
           <a:xfrm>
             <a:off x="504000" y="301320"/>
-            <a:ext cx="9071280" cy="1261800"/>
+            <a:ext cx="9072000" cy="1261800"/>
           </a:xfrm>
           <a:prstGeom prst="rect">
             <a:avLst/>
@@ -830,8 +830,8 @@
         </p:nvSpPr>
         <p:spPr>
           <a:xfrm>
-            <a:off x="504000" y="1769040"/>
-            <a:ext cx="4426560" cy="4384080"/>
+            <a:off x="504000" y="1768680"/>
+            <a:ext cx="4426920" cy="4384080"/>
           </a:xfrm>
           <a:prstGeom prst="rect">
             <a:avLst/>
@@ -866,8 +866,8 @@
         </p:nvSpPr>
         <p:spPr>
           <a:xfrm>
-            <a:off x="5152320" y="1769040"/>
-            <a:ext cx="4426560" cy="4384080"/>
+            <a:off x="5152680" y="1768680"/>
+            <a:ext cx="4426920" cy="4384080"/>
           </a:xfrm>
           <a:prstGeom prst="rect">
             <a:avLst/>
@@ -925,7 +925,7 @@
         <p:spPr>
           <a:xfrm>
             <a:off x="504000" y="301320"/>
-            <a:ext cx="9071280" cy="1261800"/>
+            <a:ext cx="9072000" cy="1261800"/>
           </a:xfrm>
           <a:prstGeom prst="rect">
             <a:avLst/>
@@ -984,7 +984,7 @@
         <p:spPr>
           <a:xfrm>
             <a:off x="504000" y="301320"/>
-            <a:ext cx="9071280" cy="5850360"/>
+            <a:ext cx="9072000" cy="5850360"/>
           </a:xfrm>
           <a:prstGeom prst="rect">
             <a:avLst/>
@@ -1043,7 +1043,7 @@
         <p:spPr>
           <a:xfrm>
             <a:off x="504000" y="301320"/>
-            <a:ext cx="9071280" cy="1261800"/>
+            <a:ext cx="9072000" cy="1261800"/>
           </a:xfrm>
           <a:prstGeom prst="rect">
             <a:avLst/>
@@ -1079,8 +1079,8 @@
         </p:nvSpPr>
         <p:spPr>
           <a:xfrm>
-            <a:off x="504000" y="1769040"/>
-            <a:ext cx="4426560" cy="2090880"/>
+            <a:off x="504000" y="1768680"/>
+            <a:ext cx="4426920" cy="2090880"/>
           </a:xfrm>
           <a:prstGeom prst="rect">
             <a:avLst/>
@@ -1115,8 +1115,8 @@
         </p:nvSpPr>
         <p:spPr>
           <a:xfrm>
-            <a:off x="504000" y="4059000"/>
-            <a:ext cx="4426560" cy="2090880"/>
+            <a:off x="504000" y="4058640"/>
+            <a:ext cx="4426920" cy="2090880"/>
           </a:xfrm>
           <a:prstGeom prst="rect">
             <a:avLst/>
@@ -1151,8 +1151,8 @@
         </p:nvSpPr>
         <p:spPr>
           <a:xfrm>
-            <a:off x="5152320" y="1769040"/>
-            <a:ext cx="4426560" cy="4384080"/>
+            <a:off x="5152680" y="1768680"/>
+            <a:ext cx="4426920" cy="4384080"/>
           </a:xfrm>
           <a:prstGeom prst="rect">
             <a:avLst/>
@@ -1210,7 +1210,7 @@
         <p:spPr>
           <a:xfrm>
             <a:off x="504000" y="301320"/>
-            <a:ext cx="9071280" cy="1261800"/>
+            <a:ext cx="9072000" cy="1261800"/>
           </a:xfrm>
           <a:prstGeom prst="rect">
             <a:avLst/>
@@ -1246,8 +1246,8 @@
         </p:nvSpPr>
         <p:spPr>
           <a:xfrm>
-            <a:off x="504000" y="1769040"/>
-            <a:ext cx="9071280" cy="4384080"/>
+            <a:off x="504000" y="1768680"/>
+            <a:ext cx="9072000" cy="4384080"/>
           </a:xfrm>
           <a:prstGeom prst="rect">
             <a:avLst/>
@@ -1306,7 +1306,7 @@
         <p:spPr>
           <a:xfrm>
             <a:off x="504000" y="301320"/>
-            <a:ext cx="9071280" cy="1261800"/>
+            <a:ext cx="9072000" cy="1261800"/>
           </a:xfrm>
           <a:prstGeom prst="rect">
             <a:avLst/>
@@ -1342,8 +1342,8 @@
         </p:nvSpPr>
         <p:spPr>
           <a:xfrm>
-            <a:off x="504000" y="1769040"/>
-            <a:ext cx="4426560" cy="4384080"/>
+            <a:off x="504000" y="1768680"/>
+            <a:ext cx="4426920" cy="4384080"/>
           </a:xfrm>
           <a:prstGeom prst="rect">
             <a:avLst/>
@@ -1378,8 +1378,8 @@
         </p:nvSpPr>
         <p:spPr>
           <a:xfrm>
-            <a:off x="5152320" y="1769040"/>
-            <a:ext cx="4426560" cy="2090880"/>
+            <a:off x="5152680" y="1768680"/>
+            <a:ext cx="4426920" cy="2090880"/>
           </a:xfrm>
           <a:prstGeom prst="rect">
             <a:avLst/>
@@ -1414,8 +1414,8 @@
         </p:nvSpPr>
         <p:spPr>
           <a:xfrm>
-            <a:off x="5152320" y="4059000"/>
-            <a:ext cx="4426560" cy="2090880"/>
+            <a:off x="5152680" y="4058640"/>
+            <a:ext cx="4426920" cy="2090880"/>
           </a:xfrm>
           <a:prstGeom prst="rect">
             <a:avLst/>
@@ -1473,7 +1473,7 @@
         <p:spPr>
           <a:xfrm>
             <a:off x="504000" y="301320"/>
-            <a:ext cx="9071280" cy="1261800"/>
+            <a:ext cx="9072000" cy="1261800"/>
           </a:xfrm>
           <a:prstGeom prst="rect">
             <a:avLst/>
@@ -1509,8 +1509,8 @@
         </p:nvSpPr>
         <p:spPr>
           <a:xfrm>
-            <a:off x="504000" y="1769040"/>
-            <a:ext cx="4426560" cy="2090880"/>
+            <a:off x="504000" y="1768680"/>
+            <a:ext cx="4426920" cy="2090880"/>
           </a:xfrm>
           <a:prstGeom prst="rect">
             <a:avLst/>
@@ -1545,8 +1545,8 @@
         </p:nvSpPr>
         <p:spPr>
           <a:xfrm>
-            <a:off x="5152320" y="1769040"/>
-            <a:ext cx="4426560" cy="2090880"/>
+            <a:off x="5152680" y="1768680"/>
+            <a:ext cx="4426920" cy="2090880"/>
           </a:xfrm>
           <a:prstGeom prst="rect">
             <a:avLst/>
@@ -1581,8 +1581,8 @@
         </p:nvSpPr>
         <p:spPr>
           <a:xfrm>
-            <a:off x="504000" y="4059000"/>
-            <a:ext cx="9071280" cy="2090880"/>
+            <a:off x="504000" y="4058640"/>
+            <a:ext cx="9072000" cy="2090880"/>
           </a:xfrm>
           <a:prstGeom prst="rect">
             <a:avLst/>
@@ -1640,7 +1640,7 @@
         <p:spPr>
           <a:xfrm>
             <a:off x="504000" y="301320"/>
-            <a:ext cx="9071280" cy="1261800"/>
+            <a:ext cx="9072000" cy="1261800"/>
           </a:xfrm>
           <a:prstGeom prst="rect">
             <a:avLst/>
@@ -1676,8 +1676,8 @@
         </p:nvSpPr>
         <p:spPr>
           <a:xfrm>
-            <a:off x="504000" y="1769040"/>
-            <a:ext cx="9071280" cy="2090880"/>
+            <a:off x="504000" y="1768680"/>
+            <a:ext cx="9072000" cy="2090880"/>
           </a:xfrm>
           <a:prstGeom prst="rect">
             <a:avLst/>
@@ -1712,8 +1712,8 @@
         </p:nvSpPr>
         <p:spPr>
           <a:xfrm>
-            <a:off x="504000" y="4059000"/>
-            <a:ext cx="9071280" cy="2090880"/>
+            <a:off x="504000" y="4058640"/>
+            <a:ext cx="9072000" cy="2090880"/>
           </a:xfrm>
           <a:prstGeom prst="rect">
             <a:avLst/>
@@ -1771,7 +1771,7 @@
         <p:spPr>
           <a:xfrm>
             <a:off x="504000" y="301320"/>
-            <a:ext cx="9071280" cy="1261800"/>
+            <a:ext cx="9072000" cy="1261800"/>
           </a:xfrm>
           <a:prstGeom prst="rect">
             <a:avLst/>
@@ -1807,8 +1807,8 @@
         </p:nvSpPr>
         <p:spPr>
           <a:xfrm>
-            <a:off x="504000" y="1769040"/>
-            <a:ext cx="4426560" cy="2090880"/>
+            <a:off x="504000" y="1768680"/>
+            <a:ext cx="4426920" cy="2090880"/>
           </a:xfrm>
           <a:prstGeom prst="rect">
             <a:avLst/>
@@ -1843,8 +1843,8 @@
         </p:nvSpPr>
         <p:spPr>
           <a:xfrm>
-            <a:off x="5152320" y="1769040"/>
-            <a:ext cx="4426560" cy="2090880"/>
+            <a:off x="5152680" y="1768680"/>
+            <a:ext cx="4426920" cy="2090880"/>
           </a:xfrm>
           <a:prstGeom prst="rect">
             <a:avLst/>
@@ -1879,8 +1879,8 @@
         </p:nvSpPr>
         <p:spPr>
           <a:xfrm>
-            <a:off x="5152320" y="4059000"/>
-            <a:ext cx="4426560" cy="2090880"/>
+            <a:off x="5152680" y="4058640"/>
+            <a:ext cx="4426920" cy="2090880"/>
           </a:xfrm>
           <a:prstGeom prst="rect">
             <a:avLst/>
@@ -1915,8 +1915,8 @@
         </p:nvSpPr>
         <p:spPr>
           <a:xfrm>
-            <a:off x="504000" y="4059000"/>
-            <a:ext cx="4426560" cy="2090880"/>
+            <a:off x="504000" y="4058640"/>
+            <a:ext cx="4426920" cy="2090880"/>
           </a:xfrm>
           <a:prstGeom prst="rect">
             <a:avLst/>
@@ -1974,7 +1974,7 @@
         <p:spPr>
           <a:xfrm>
             <a:off x="504000" y="301320"/>
-            <a:ext cx="9071280" cy="1261800"/>
+            <a:ext cx="9072000" cy="1261800"/>
           </a:xfrm>
           <a:prstGeom prst="rect">
             <a:avLst/>
@@ -2010,8 +2010,8 @@
         </p:nvSpPr>
         <p:spPr>
           <a:xfrm>
-            <a:off x="504000" y="1769040"/>
-            <a:ext cx="9071280" cy="4384080"/>
+            <a:off x="504000" y="1768680"/>
+            <a:ext cx="9072000" cy="4384080"/>
           </a:xfrm>
           <a:prstGeom prst="rect">
             <a:avLst/>
@@ -2046,8 +2046,8 @@
         </p:nvSpPr>
         <p:spPr>
           <a:xfrm>
-            <a:off x="504000" y="1769040"/>
-            <a:ext cx="9071280" cy="4384080"/>
+            <a:off x="504000" y="1768680"/>
+            <a:ext cx="9072000" cy="4384080"/>
           </a:xfrm>
           <a:prstGeom prst="rect">
             <a:avLst/>
@@ -2082,7 +2082,7 @@
         </p:blipFill>
         <p:spPr>
           <a:xfrm>
-            <a:off x="2292120" y="1769040"/>
+            <a:off x="2292480" y="1768680"/>
             <a:ext cx="5494680" cy="4384080"/>
           </a:xfrm>
           <a:prstGeom prst="rect">
@@ -2105,7 +2105,7 @@
         </p:blipFill>
         <p:spPr>
           <a:xfrm>
-            <a:off x="2292120" y="1769040"/>
+            <a:off x="2292480" y="1768680"/>
             <a:ext cx="5494680" cy="4384080"/>
           </a:xfrm>
           <a:prstGeom prst="rect">
@@ -2151,7 +2151,7 @@
         <p:spPr>
           <a:xfrm>
             <a:off x="504000" y="301320"/>
-            <a:ext cx="9071280" cy="1261800"/>
+            <a:ext cx="9072000" cy="1261800"/>
           </a:xfrm>
           <a:prstGeom prst="rect">
             <a:avLst/>
@@ -2187,8 +2187,8 @@
         </p:nvSpPr>
         <p:spPr>
           <a:xfrm>
-            <a:off x="504000" y="1769040"/>
-            <a:ext cx="9071280" cy="4384080"/>
+            <a:off x="504000" y="1768680"/>
+            <a:ext cx="9072000" cy="4384080"/>
           </a:xfrm>
           <a:prstGeom prst="rect">
             <a:avLst/>
@@ -2246,7 +2246,7 @@
         <p:spPr>
           <a:xfrm>
             <a:off x="504000" y="301320"/>
-            <a:ext cx="9071280" cy="1261800"/>
+            <a:ext cx="9072000" cy="1261800"/>
           </a:xfrm>
           <a:prstGeom prst="rect">
             <a:avLst/>
@@ -2282,8 +2282,8 @@
         </p:nvSpPr>
         <p:spPr>
           <a:xfrm>
-            <a:off x="504000" y="1769040"/>
-            <a:ext cx="4426560" cy="4384080"/>
+            <a:off x="504000" y="1768680"/>
+            <a:ext cx="4426920" cy="4384080"/>
           </a:xfrm>
           <a:prstGeom prst="rect">
             <a:avLst/>
@@ -2318,8 +2318,8 @@
         </p:nvSpPr>
         <p:spPr>
           <a:xfrm>
-            <a:off x="5152320" y="1769040"/>
-            <a:ext cx="4426560" cy="4384080"/>
+            <a:off x="5152680" y="1768680"/>
+            <a:ext cx="4426920" cy="4384080"/>
           </a:xfrm>
           <a:prstGeom prst="rect">
             <a:avLst/>
@@ -2377,7 +2377,7 @@
         <p:spPr>
           <a:xfrm>
             <a:off x="504000" y="301320"/>
-            <a:ext cx="9071280" cy="1261800"/>
+            <a:ext cx="9072000" cy="1261800"/>
           </a:xfrm>
           <a:prstGeom prst="rect">
             <a:avLst/>
@@ -2436,7 +2436,7 @@
         <p:spPr>
           <a:xfrm>
             <a:off x="504000" y="301320"/>
-            <a:ext cx="9071280" cy="5850360"/>
+            <a:ext cx="9072000" cy="5850360"/>
           </a:xfrm>
           <a:prstGeom prst="rect">
             <a:avLst/>
@@ -2495,7 +2495,7 @@
         <p:spPr>
           <a:xfrm>
             <a:off x="504000" y="301320"/>
-            <a:ext cx="9071280" cy="1261800"/>
+            <a:ext cx="9072000" cy="1261800"/>
           </a:xfrm>
           <a:prstGeom prst="rect">
             <a:avLst/>
@@ -2531,8 +2531,8 @@
         </p:nvSpPr>
         <p:spPr>
           <a:xfrm>
-            <a:off x="504000" y="1769040"/>
-            <a:ext cx="4426560" cy="2090880"/>
+            <a:off x="504000" y="1768680"/>
+            <a:ext cx="4426920" cy="2090880"/>
           </a:xfrm>
           <a:prstGeom prst="rect">
             <a:avLst/>
@@ -2567,8 +2567,8 @@
         </p:nvSpPr>
         <p:spPr>
           <a:xfrm>
-            <a:off x="504000" y="4059000"/>
-            <a:ext cx="4426560" cy="2090880"/>
+            <a:off x="504000" y="4058640"/>
+            <a:ext cx="4426920" cy="2090880"/>
           </a:xfrm>
           <a:prstGeom prst="rect">
             <a:avLst/>
@@ -2603,8 +2603,8 @@
         </p:nvSpPr>
         <p:spPr>
           <a:xfrm>
-            <a:off x="5152320" y="1769040"/>
-            <a:ext cx="4426560" cy="4384080"/>
+            <a:off x="5152680" y="1768680"/>
+            <a:ext cx="4426920" cy="4384080"/>
           </a:xfrm>
           <a:prstGeom prst="rect">
             <a:avLst/>
@@ -2662,7 +2662,7 @@
         <p:spPr>
           <a:xfrm>
             <a:off x="504000" y="301320"/>
-            <a:ext cx="9071280" cy="1261800"/>
+            <a:ext cx="9072000" cy="1261800"/>
           </a:xfrm>
           <a:prstGeom prst="rect">
             <a:avLst/>
@@ -2698,8 +2698,8 @@
         </p:nvSpPr>
         <p:spPr>
           <a:xfrm>
-            <a:off x="504000" y="1769040"/>
-            <a:ext cx="4426560" cy="4384080"/>
+            <a:off x="504000" y="1768680"/>
+            <a:ext cx="4426920" cy="4384080"/>
           </a:xfrm>
           <a:prstGeom prst="rect">
             <a:avLst/>
@@ -2734,8 +2734,8 @@
         </p:nvSpPr>
         <p:spPr>
           <a:xfrm>
-            <a:off x="5152320" y="1769040"/>
-            <a:ext cx="4426560" cy="2090880"/>
+            <a:off x="5152680" y="1768680"/>
+            <a:ext cx="4426920" cy="2090880"/>
           </a:xfrm>
           <a:prstGeom prst="rect">
             <a:avLst/>
@@ -2770,8 +2770,8 @@
         </p:nvSpPr>
         <p:spPr>
           <a:xfrm>
-            <a:off x="5152320" y="4059000"/>
-            <a:ext cx="4426560" cy="2090880"/>
+            <a:off x="5152680" y="4058640"/>
+            <a:ext cx="4426920" cy="2090880"/>
           </a:xfrm>
           <a:prstGeom prst="rect">
             <a:avLst/>
@@ -2829,7 +2829,7 @@
         <p:spPr>
           <a:xfrm>
             <a:off x="504000" y="301320"/>
-            <a:ext cx="9071280" cy="1261800"/>
+            <a:ext cx="9072000" cy="1261800"/>
           </a:xfrm>
           <a:prstGeom prst="rect">
             <a:avLst/>
@@ -2865,8 +2865,8 @@
         </p:nvSpPr>
         <p:spPr>
           <a:xfrm>
-            <a:off x="504000" y="1769040"/>
-            <a:ext cx="4426560" cy="2090880"/>
+            <a:off x="504000" y="1768680"/>
+            <a:ext cx="4426920" cy="2090880"/>
           </a:xfrm>
           <a:prstGeom prst="rect">
             <a:avLst/>
@@ -2901,8 +2901,8 @@
         </p:nvSpPr>
         <p:spPr>
           <a:xfrm>
-            <a:off x="5152320" y="1769040"/>
-            <a:ext cx="4426560" cy="2090880"/>
+            <a:off x="5152680" y="1768680"/>
+            <a:ext cx="4426920" cy="2090880"/>
           </a:xfrm>
           <a:prstGeom prst="rect">
             <a:avLst/>
@@ -2937,8 +2937,8 @@
         </p:nvSpPr>
         <p:spPr>
           <a:xfrm>
-            <a:off x="504000" y="4059000"/>
-            <a:ext cx="9071280" cy="2090880"/>
+            <a:off x="504000" y="4058640"/>
+            <a:ext cx="9072000" cy="2090880"/>
           </a:xfrm>
           <a:prstGeom prst="rect">
             <a:avLst/>
@@ -2996,7 +2996,7 @@
         <p:spPr>
           <a:xfrm>
             <a:off x="504000" y="301320"/>
-            <a:ext cx="9071280" cy="1261800"/>
+            <a:ext cx="9070920" cy="1261440"/>
           </a:xfrm>
           <a:prstGeom prst="rect">
             <a:avLst/>
@@ -3032,8 +3032,8 @@
         </p:nvSpPr>
         <p:spPr>
           <a:xfrm>
-            <a:off x="504000" y="1768680"/>
-            <a:ext cx="9072000" cy="4384080"/>
+            <a:off x="504000" y="1769040"/>
+            <a:ext cx="9070920" cy="4383720"/>
           </a:xfrm>
           <a:prstGeom prst="rect">
             <a:avLst/>
@@ -3051,7 +3051,7 @@
               <a:buChar char=""/>
             </a:pPr>
             <a:r>
-              <a:rPr b="0" lang="ru-RU" sz="3200" spc="-1" strike="noStrike">
+              <a:rPr b="0" lang="ru-RU" sz="1800" spc="-1" strike="noStrike">
                 <a:solidFill>
                   <a:srgbClr val="000000"/>
                 </a:solidFill>
@@ -3064,7 +3064,7 @@
               </a:rPr>
               <a:t>Для правки структуры щёлкните мышью</a:t>
             </a:r>
-            <a:endParaRPr b="0" lang="ru-RU" sz="3200" spc="-1" strike="noStrike">
+            <a:endParaRPr b="0" lang="ru-RU" sz="1800" spc="-1" strike="noStrike">
               <a:solidFill>
                 <a:srgbClr val="000000"/>
               </a:solidFill>
@@ -3086,7 +3086,7 @@
               <a:buChar char=""/>
             </a:pPr>
             <a:r>
-              <a:rPr b="0" lang="ru-RU" sz="2800" spc="-1" strike="noStrike">
+              <a:rPr b="0" lang="ru-RU" sz="1800" spc="-1" strike="noStrike">
                 <a:solidFill>
                   <a:srgbClr val="000000"/>
                 </a:solidFill>
@@ -3099,7 +3099,7 @@
               </a:rPr>
               <a:t>Второй уровень структуры</a:t>
             </a:r>
-            <a:endParaRPr b="0" lang="ru-RU" sz="2800" spc="-1" strike="noStrike">
+            <a:endParaRPr b="0" lang="ru-RU" sz="1800" spc="-1" strike="noStrike">
               <a:solidFill>
                 <a:srgbClr val="000000"/>
               </a:solidFill>
@@ -3121,7 +3121,7 @@
               <a:buChar char=""/>
             </a:pPr>
             <a:r>
-              <a:rPr b="0" lang="ru-RU" sz="2400" spc="-1" strike="noStrike">
+              <a:rPr b="0" lang="ru-RU" sz="1800" spc="-1" strike="noStrike">
                 <a:solidFill>
                   <a:srgbClr val="000000"/>
                 </a:solidFill>
@@ -3134,7 +3134,7 @@
               </a:rPr>
               <a:t>Третий уровень структуры</a:t>
             </a:r>
-            <a:endParaRPr b="0" lang="ru-RU" sz="2400" spc="-1" strike="noStrike">
+            <a:endParaRPr b="0" lang="ru-RU" sz="1800" spc="-1" strike="noStrike">
               <a:solidFill>
                 <a:srgbClr val="000000"/>
               </a:solidFill>
@@ -3156,7 +3156,7 @@
               <a:buChar char=""/>
             </a:pPr>
             <a:r>
-              <a:rPr b="0" lang="ru-RU" sz="2000" spc="-1" strike="noStrike">
+              <a:rPr b="0" lang="ru-RU" sz="1800" spc="-1" strike="noStrike">
                 <a:solidFill>
                   <a:srgbClr val="000000"/>
                 </a:solidFill>
@@ -3169,7 +3169,7 @@
               </a:rPr>
               <a:t>Четвёртый уровень структуры</a:t>
             </a:r>
-            <a:endParaRPr b="0" lang="ru-RU" sz="2000" spc="-1" strike="noStrike">
+            <a:endParaRPr b="0" lang="ru-RU" sz="1800" spc="-1" strike="noStrike">
               <a:solidFill>
                 <a:srgbClr val="000000"/>
               </a:solidFill>
@@ -3191,7 +3191,7 @@
               <a:buChar char=""/>
             </a:pPr>
             <a:r>
-              <a:rPr b="0" lang="ru-RU" sz="2000" spc="-1" strike="noStrike">
+              <a:rPr b="0" lang="ru-RU" sz="1800" spc="-1" strike="noStrike">
                 <a:solidFill>
                   <a:srgbClr val="000000"/>
                 </a:solidFill>
@@ -3204,7 +3204,7 @@
               </a:rPr>
               <a:t>Пятый уровень структуры</a:t>
             </a:r>
-            <a:endParaRPr b="0" lang="ru-RU" sz="2000" spc="-1" strike="noStrike">
+            <a:endParaRPr b="0" lang="ru-RU" sz="1800" spc="-1" strike="noStrike">
               <a:solidFill>
                 <a:srgbClr val="000000"/>
               </a:solidFill>
@@ -3226,7 +3226,7 @@
               <a:buChar char=""/>
             </a:pPr>
             <a:r>
-              <a:rPr b="0" lang="ru-RU" sz="2000" spc="-1" strike="noStrike">
+              <a:rPr b="0" lang="ru-RU" sz="1800" spc="-1" strike="noStrike">
                 <a:solidFill>
                   <a:srgbClr val="000000"/>
                 </a:solidFill>
@@ -3239,7 +3239,7 @@
               </a:rPr>
               <a:t>Шестой уровень структуры</a:t>
             </a:r>
-            <a:endParaRPr b="0" lang="ru-RU" sz="2000" spc="-1" strike="noStrike">
+            <a:endParaRPr b="0" lang="ru-RU" sz="1800" spc="-1" strike="noStrike">
               <a:solidFill>
                 <a:srgbClr val="000000"/>
               </a:solidFill>
@@ -3261,7 +3261,7 @@
               <a:buChar char=""/>
             </a:pPr>
             <a:r>
-              <a:rPr b="0" lang="ru-RU" sz="2000" spc="-1" strike="noStrike">
+              <a:rPr b="0" lang="ru-RU" sz="1800" spc="-1" strike="noStrike">
                 <a:solidFill>
                   <a:srgbClr val="000000"/>
                 </a:solidFill>
@@ -3274,7 +3274,7 @@
               </a:rPr>
               <a:t>Седьмой уровень структуры</a:t>
             </a:r>
-            <a:endParaRPr b="0" lang="ru-RU" sz="2000" spc="-1" strike="noStrike">
+            <a:endParaRPr b="0" lang="ru-RU" sz="1800" spc="-1" strike="noStrike">
               <a:solidFill>
                 <a:srgbClr val="000000"/>
               </a:solidFill>
@@ -3338,7 +3338,7 @@
         <p:spPr>
           <a:xfrm>
             <a:off x="504000" y="301320"/>
-            <a:ext cx="9071280" cy="1261800"/>
+            <a:ext cx="9072000" cy="1261800"/>
           </a:xfrm>
           <a:prstGeom prst="rect">
             <a:avLst/>
@@ -3348,6 +3348,20 @@
           <a:bodyPr lIns="0" rIns="0" tIns="0" bIns="0" anchor="ctr"/>
           <a:p>
             <a:pPr algn="ctr"/>
+            <a:r>
+              <a:rPr b="0" lang="ru-RU" sz="4400" spc="-1" strike="noStrike">
+                <a:solidFill>
+                  <a:srgbClr val="000000"/>
+                </a:solidFill>
+                <a:uFill>
+                  <a:solidFill>
+                    <a:srgbClr val="ffffff"/>
+                  </a:solidFill>
+                </a:uFill>
+                <a:latin typeface="Arial"/>
+              </a:rPr>
+              <a:t>Для правки текста заголовка щёлкните мышью</a:t>
+            </a:r>
             <a:endParaRPr b="0" lang="ru-RU" sz="4400" spc="-1" strike="noStrike">
               <a:solidFill>
                 <a:srgbClr val="000000"/>
@@ -3374,8 +3388,8 @@
         </p:nvSpPr>
         <p:spPr>
           <a:xfrm>
-            <a:off x="504000" y="1769040"/>
-            <a:ext cx="9071280" cy="4384080"/>
+            <a:off x="504000" y="1768680"/>
+            <a:ext cx="9072000" cy="4384080"/>
           </a:xfrm>
           <a:prstGeom prst="rect">
             <a:avLst/>
@@ -3393,7 +3407,7 @@
               <a:buChar char=""/>
             </a:pPr>
             <a:r>
-              <a:rPr b="0" lang="ru-RU" sz="1800" spc="-1" strike="noStrike">
+              <a:rPr b="0" lang="ru-RU" sz="3200" spc="-1" strike="noStrike">
                 <a:solidFill>
                   <a:srgbClr val="000000"/>
                 </a:solidFill>
@@ -3406,7 +3420,7 @@
               </a:rPr>
               <a:t>Для правки структуры щёлкните мышью</a:t>
             </a:r>
-            <a:endParaRPr b="0" lang="ru-RU" sz="1800" spc="-1" strike="noStrike">
+            <a:endParaRPr b="0" lang="ru-RU" sz="3200" spc="-1" strike="noStrike">
               <a:solidFill>
                 <a:srgbClr val="000000"/>
               </a:solidFill>
@@ -3428,7 +3442,7 @@
               <a:buChar char=""/>
             </a:pPr>
             <a:r>
-              <a:rPr b="0" lang="ru-RU" sz="1800" spc="-1" strike="noStrike">
+              <a:rPr b="0" lang="ru-RU" sz="2800" spc="-1" strike="noStrike">
                 <a:solidFill>
                   <a:srgbClr val="000000"/>
                 </a:solidFill>
@@ -3441,7 +3455,7 @@
               </a:rPr>
               <a:t>Второй уровень структуры</a:t>
             </a:r>
-            <a:endParaRPr b="0" lang="ru-RU" sz="1800" spc="-1" strike="noStrike">
+            <a:endParaRPr b="0" lang="ru-RU" sz="2800" spc="-1" strike="noStrike">
               <a:solidFill>
                 <a:srgbClr val="000000"/>
               </a:solidFill>
@@ -3463,7 +3477,7 @@
               <a:buChar char=""/>
             </a:pPr>
             <a:r>
-              <a:rPr b="0" lang="ru-RU" sz="1800" spc="-1" strike="noStrike">
+              <a:rPr b="0" lang="ru-RU" sz="2400" spc="-1" strike="noStrike">
                 <a:solidFill>
                   <a:srgbClr val="000000"/>
                 </a:solidFill>
@@ -3476,7 +3490,7 @@
               </a:rPr>
               <a:t>Третий уровень структуры</a:t>
             </a:r>
-            <a:endParaRPr b="0" lang="ru-RU" sz="1800" spc="-1" strike="noStrike">
+            <a:endParaRPr b="0" lang="ru-RU" sz="2400" spc="-1" strike="noStrike">
               <a:solidFill>
                 <a:srgbClr val="000000"/>
               </a:solidFill>
@@ -3498,7 +3512,7 @@
               <a:buChar char=""/>
             </a:pPr>
             <a:r>
-              <a:rPr b="0" lang="ru-RU" sz="1800" spc="-1" strike="noStrike">
+              <a:rPr b="0" lang="ru-RU" sz="2000" spc="-1" strike="noStrike">
                 <a:solidFill>
                   <a:srgbClr val="000000"/>
                 </a:solidFill>
@@ -3511,7 +3525,7 @@
               </a:rPr>
               <a:t>Четвёртый уровень структуры</a:t>
             </a:r>
-            <a:endParaRPr b="0" lang="ru-RU" sz="1800" spc="-1" strike="noStrike">
+            <a:endParaRPr b="0" lang="ru-RU" sz="2000" spc="-1" strike="noStrike">
               <a:solidFill>
                 <a:srgbClr val="000000"/>
               </a:solidFill>
@@ -3533,7 +3547,7 @@
               <a:buChar char=""/>
             </a:pPr>
             <a:r>
-              <a:rPr b="0" lang="ru-RU" sz="1800" spc="-1" strike="noStrike">
+              <a:rPr b="0" lang="ru-RU" sz="2000" spc="-1" strike="noStrike">
                 <a:solidFill>
                   <a:srgbClr val="000000"/>
                 </a:solidFill>
@@ -3546,7 +3560,7 @@
               </a:rPr>
               <a:t>Пятый уровень структуры</a:t>
             </a:r>
-            <a:endParaRPr b="0" lang="ru-RU" sz="1800" spc="-1" strike="noStrike">
+            <a:endParaRPr b="0" lang="ru-RU" sz="2000" spc="-1" strike="noStrike">
               <a:solidFill>
                 <a:srgbClr val="000000"/>
               </a:solidFill>
@@ -3568,7 +3582,7 @@
               <a:buChar char=""/>
             </a:pPr>
             <a:r>
-              <a:rPr b="0" lang="ru-RU" sz="1800" spc="-1" strike="noStrike">
+              <a:rPr b="0" lang="ru-RU" sz="2000" spc="-1" strike="noStrike">
                 <a:solidFill>
                   <a:srgbClr val="000000"/>
                 </a:solidFill>
@@ -3581,7 +3595,7 @@
               </a:rPr>
               <a:t>Шестой уровень структуры</a:t>
             </a:r>
-            <a:endParaRPr b="0" lang="ru-RU" sz="1800" spc="-1" strike="noStrike">
+            <a:endParaRPr b="0" lang="ru-RU" sz="2000" spc="-1" strike="noStrike">
               <a:solidFill>
                 <a:srgbClr val="000000"/>
               </a:solidFill>
@@ -3603,7 +3617,7 @@
               <a:buChar char=""/>
             </a:pPr>
             <a:r>
-              <a:rPr b="0" lang="ru-RU" sz="1800" spc="-1" strike="noStrike">
+              <a:rPr b="0" lang="ru-RU" sz="2000" spc="-1" strike="noStrike">
                 <a:solidFill>
                   <a:srgbClr val="000000"/>
                 </a:solidFill>
@@ -3616,7 +3630,7 @@
               </a:rPr>
               <a:t>Седьмой уровень структуры</a:t>
             </a:r>
-            <a:endParaRPr b="0" lang="ru-RU" sz="1800" spc="-1" strike="noStrike">
+            <a:endParaRPr b="0" lang="ru-RU" sz="2000" spc="-1" strike="noStrike">
               <a:solidFill>
                 <a:srgbClr val="000000"/>
               </a:solidFill>
@@ -3676,7 +3690,7 @@
         <p:spPr>
           <a:xfrm>
             <a:off x="504360" y="1742040"/>
-            <a:ext cx="9071280" cy="2246760"/>
+            <a:ext cx="9070920" cy="2246400"/>
           </a:xfrm>
           <a:prstGeom prst="rect">
             <a:avLst/>
@@ -3695,7 +3709,11 @@
         <p:txBody>
           <a:bodyPr lIns="0" rIns="0" tIns="0" bIns="0" anchor="ctr"/>
           <a:p>
-            <a:pPr algn="ctr"/>
+            <a:pPr algn="ctr">
+              <a:lnSpc>
+                <a:spcPct val="100000"/>
+              </a:lnSpc>
+            </a:pPr>
             <a:r>
               <a:rPr b="0" lang="ru-RU" sz="3600" spc="-1" strike="noStrike">
                 <a:solidFill>
@@ -3707,6 +3725,7 @@
                   </a:solidFill>
                 </a:uFill>
                 <a:latin typeface="Trebuchet MS"/>
+                <a:ea typeface="DejaVu Sans"/>
               </a:rPr>
               <a:t>Отчет по проекту</a:t>
             </a:r>
@@ -3723,7 +3742,11 @@
             </a:endParaRPr>
           </a:p>
           <a:p>
-            <a:pPr algn="ctr"/>
+            <a:pPr algn="ctr">
+              <a:lnSpc>
+                <a:spcPct val="100000"/>
+              </a:lnSpc>
+            </a:pPr>
             <a:r>
               <a:rPr b="0" lang="ru-RU" sz="2600" spc="-1" strike="noStrike">
                 <a:solidFill>
@@ -3735,6 +3758,7 @@
                   </a:solidFill>
                 </a:uFill>
                 <a:latin typeface="Trebuchet MS"/>
+                <a:ea typeface="DejaVu Sans"/>
               </a:rPr>
               <a:t> </a:t>
             </a:r>
@@ -3767,6 +3791,7 @@
                   </a:solidFill>
                 </a:uFill>
                 <a:latin typeface="Trebuchet MS"/>
+                <a:ea typeface="DejaVu Sans"/>
               </a:rPr>
               <a:t>Pathplanning.ru :: Анализ карт местности</a:t>
             </a:r>
@@ -3793,7 +3818,7 @@
         <p:spPr>
           <a:xfrm>
             <a:off x="720000" y="6093720"/>
-            <a:ext cx="6009840" cy="915840"/>
+            <a:ext cx="6009480" cy="915480"/>
           </a:xfrm>
           <a:prstGeom prst="rect">
             <a:avLst/>
@@ -3823,6 +3848,7 @@
                   </a:solidFill>
                 </a:uFill>
                 <a:latin typeface="Trebuchet MS"/>
+                <a:ea typeface="DejaVu Sans"/>
               </a:rPr>
               <a:t>Выполнил: Андрей Соколов, БПМИ151</a:t>
             </a:r>
@@ -3850,6 +3876,7 @@
                   </a:solidFill>
                 </a:uFill>
                 <a:latin typeface="Trebuchet MS"/>
+                <a:ea typeface="DejaVu Sans"/>
               </a:rPr>
               <a:t>Ментор: Яковлев К. С.</a:t>
             </a:r>
@@ -3925,7 +3952,7 @@
         <p:spPr>
           <a:xfrm>
             <a:off x="504000" y="301320"/>
-            <a:ext cx="9071280" cy="1261800"/>
+            <a:ext cx="9070920" cy="1261440"/>
           </a:xfrm>
           <a:prstGeom prst="rect">
             <a:avLst/>
@@ -3950,7 +3977,7 @@
               </a:lnSpc>
             </a:pPr>
             <a:r>
-              <a:rPr b="0" lang="ru-RU" sz="4400" spc="-1" strike="noStrike">
+              <a:rPr b="1" lang="ru-RU" sz="4400" spc="-1" strike="noStrike">
                 <a:solidFill>
                   <a:srgbClr val="000000"/>
                 </a:solidFill>
@@ -3960,10 +3987,11 @@
                   </a:solidFill>
                 </a:uFill>
                 <a:latin typeface="Trebuchet MS"/>
+                <a:ea typeface="DejaVu Sans"/>
               </a:rPr>
               <a:t>Задачи проекта</a:t>
             </a:r>
-            <a:endParaRPr b="0" lang="ru-RU" sz="1800" spc="-1" strike="noStrike">
+            <a:endParaRPr b="1" lang="ru-RU" sz="1800" spc="-1" strike="noStrike">
               <a:solidFill>
                 <a:srgbClr val="000000"/>
               </a:solidFill>
@@ -3986,7 +4014,7 @@
         <p:spPr>
           <a:xfrm>
             <a:off x="504000" y="1769040"/>
-            <a:ext cx="9071280" cy="4384080"/>
+            <a:ext cx="9070920" cy="4383720"/>
           </a:xfrm>
           <a:prstGeom prst="rect">
             <a:avLst/>
@@ -4005,14 +4033,14 @@
       </p:sp>
       <p:sp>
         <p:nvSpPr>
-          <p:cNvPr id="76" name="TextShape 3"/>
-          <p:cNvSpPr txBox="1"/>
+          <p:cNvPr id="76" name="CustomShape 3"/>
+          <p:cNvSpPr/>
           <p:nvPr/>
         </p:nvSpPr>
         <p:spPr>
           <a:xfrm>
             <a:off x="720000" y="2323080"/>
-            <a:ext cx="8424000" cy="3508920"/>
+            <a:ext cx="8423640" cy="3508560"/>
           </a:xfrm>
           <a:prstGeom prst="rect">
             <a:avLst/>
@@ -4022,6 +4050,12 @@
             <a:noFill/>
           </a:ln>
         </p:spPr>
+        <p:style>
+          <a:lnRef idx="0"/>
+          <a:fillRef idx="0"/>
+          <a:effectRef idx="0"/>
+          <a:fontRef idx="minor"/>
+        </p:style>
         <p:txBody>
           <a:bodyPr lIns="90000" rIns="90000" tIns="45000" bIns="45000"/>
           <a:p>
@@ -4040,21 +4074,20 @@
                     <a:srgbClr val="ffffff"/>
                   </a:solidFill>
                 </a:uFill>
-                <a:latin typeface="Arial"/>
+                <a:latin typeface="Calibri"/>
               </a:rPr>
               <a:t>Есть входной файл в формате XML, в котором хранятся данные о карте.</a:t>
             </a:r>
-            <a:endParaRPr b="0" lang="ru-RU" sz="2400" spc="-1" strike="noStrike">
-              <a:solidFill>
-                <a:srgbClr val="000000"/>
-              </a:solidFill>
-              <a:uFill>
-                <a:solidFill>
-                  <a:srgbClr val="ffffff"/>
-                </a:solidFill>
-              </a:uFill>
-              <a:latin typeface="Arial"/>
-              <a:ea typeface="Microsoft YaHei"/>
+            <a:endParaRPr b="0" lang="ru-RU" sz="1800" spc="-1" strike="noStrike">
+              <a:solidFill>
+                <a:srgbClr val="000000"/>
+              </a:solidFill>
+              <a:uFill>
+                <a:solidFill>
+                  <a:srgbClr val="ffffff"/>
+                </a:solidFill>
+              </a:uFill>
+              <a:latin typeface="Calibri"/>
             </a:endParaRPr>
           </a:p>
           <a:p>
@@ -4063,17 +4096,16 @@
                 <a:spcPct val="100000"/>
               </a:lnSpc>
             </a:pPr>
-            <a:endParaRPr b="0" lang="ru-RU" sz="2400" spc="-1" strike="noStrike">
-              <a:solidFill>
-                <a:srgbClr val="000000"/>
-              </a:solidFill>
-              <a:uFill>
-                <a:solidFill>
-                  <a:srgbClr val="ffffff"/>
-                </a:solidFill>
-              </a:uFill>
-              <a:latin typeface="Arial"/>
-              <a:ea typeface="Microsoft YaHei"/>
+            <a:endParaRPr b="0" lang="ru-RU" sz="1800" spc="-1" strike="noStrike">
+              <a:solidFill>
+                <a:srgbClr val="000000"/>
+              </a:solidFill>
+              <a:uFill>
+                <a:solidFill>
+                  <a:srgbClr val="ffffff"/>
+                </a:solidFill>
+              </a:uFill>
+              <a:latin typeface="Calibri"/>
             </a:endParaRPr>
           </a:p>
           <a:p>
@@ -4092,25 +4124,25 @@
                     <a:srgbClr val="ffffff"/>
                   </a:solidFill>
                 </a:uFill>
-                <a:latin typeface="Arial"/>
+                <a:latin typeface="Calibri"/>
+                <a:ea typeface="Microsoft YaHei"/>
               </a:rPr>
               <a:t>Необходимо:</a:t>
             </a:r>
-            <a:endParaRPr b="0" lang="ru-RU" sz="2400" spc="-1" strike="noStrike">
-              <a:solidFill>
-                <a:srgbClr val="000000"/>
-              </a:solidFill>
-              <a:uFill>
-                <a:solidFill>
-                  <a:srgbClr val="ffffff"/>
-                </a:solidFill>
-              </a:uFill>
-              <a:latin typeface="Arial"/>
-              <a:ea typeface="Microsoft YaHei"/>
-            </a:endParaRPr>
-          </a:p>
-          <a:p>
-            <a:pPr marL="216000" indent="-216000">
+            <a:endParaRPr b="0" lang="ru-RU" sz="1800" spc="-1" strike="noStrike">
+              <a:solidFill>
+                <a:srgbClr val="000000"/>
+              </a:solidFill>
+              <a:uFill>
+                <a:solidFill>
+                  <a:srgbClr val="ffffff"/>
+                </a:solidFill>
+              </a:uFill>
+              <a:latin typeface="Calibri"/>
+            </a:endParaRPr>
+          </a:p>
+          <a:p>
+            <a:pPr marL="216000" indent="-215640">
               <a:lnSpc>
                 <a:spcPct val="100000"/>
               </a:lnSpc>
@@ -4131,25 +4163,25 @@
                     <a:srgbClr val="ffffff"/>
                   </a:solidFill>
                 </a:uFill>
-                <a:latin typeface="Arial"/>
+                <a:latin typeface="Calibri"/>
+                <a:ea typeface="Microsoft YaHei"/>
               </a:rPr>
               <a:t>Считать данные из входного файла</a:t>
             </a:r>
-            <a:endParaRPr b="0" lang="ru-RU" sz="2400" spc="-1" strike="noStrike">
-              <a:solidFill>
-                <a:srgbClr val="000000"/>
-              </a:solidFill>
-              <a:uFill>
-                <a:solidFill>
-                  <a:srgbClr val="ffffff"/>
-                </a:solidFill>
-              </a:uFill>
-              <a:latin typeface="Arial"/>
-              <a:ea typeface="Microsoft YaHei"/>
-            </a:endParaRPr>
-          </a:p>
-          <a:p>
-            <a:pPr marL="216000" indent="-216000">
+            <a:endParaRPr b="0" lang="ru-RU" sz="1800" spc="-1" strike="noStrike">
+              <a:solidFill>
+                <a:srgbClr val="000000"/>
+              </a:solidFill>
+              <a:uFill>
+                <a:solidFill>
+                  <a:srgbClr val="ffffff"/>
+                </a:solidFill>
+              </a:uFill>
+              <a:latin typeface="Calibri"/>
+            </a:endParaRPr>
+          </a:p>
+          <a:p>
+            <a:pPr marL="216000" indent="-215640">
               <a:lnSpc>
                 <a:spcPct val="100000"/>
               </a:lnSpc>
@@ -4170,25 +4202,25 @@
                     <a:srgbClr val="ffffff"/>
                   </a:solidFill>
                 </a:uFill>
-                <a:latin typeface="Arial"/>
+                <a:latin typeface="Calibri"/>
+                <a:ea typeface="Microsoft YaHei"/>
               </a:rPr>
               <a:t>Посчитать разные численные характеристики карты (количество препятствий, их площади и периметры, дисперсию, доля свободного пространства на карте)</a:t>
             </a:r>
-            <a:endParaRPr b="0" lang="ru-RU" sz="2400" spc="-1" strike="noStrike">
-              <a:solidFill>
-                <a:srgbClr val="000000"/>
-              </a:solidFill>
-              <a:uFill>
-                <a:solidFill>
-                  <a:srgbClr val="ffffff"/>
-                </a:solidFill>
-              </a:uFill>
-              <a:latin typeface="Arial"/>
-              <a:ea typeface="Microsoft YaHei"/>
-            </a:endParaRPr>
-          </a:p>
-          <a:p>
-            <a:pPr marL="216000" indent="-216000">
+            <a:endParaRPr b="0" lang="ru-RU" sz="1800" spc="-1" strike="noStrike">
+              <a:solidFill>
+                <a:srgbClr val="000000"/>
+              </a:solidFill>
+              <a:uFill>
+                <a:solidFill>
+                  <a:srgbClr val="ffffff"/>
+                </a:solidFill>
+              </a:uFill>
+              <a:latin typeface="Calibri"/>
+            </a:endParaRPr>
+          </a:p>
+          <a:p>
+            <a:pPr marL="216000" indent="-215640">
               <a:lnSpc>
                 <a:spcPct val="100000"/>
               </a:lnSpc>
@@ -4209,21 +4241,21 @@
                     <a:srgbClr val="ffffff"/>
                   </a:solidFill>
                 </a:uFill>
-                <a:latin typeface="Arial"/>
+                <a:latin typeface="Calibri"/>
+                <a:ea typeface="Microsoft YaHei"/>
               </a:rPr>
               <a:t>Сохранить результаты работы в новый XML-файл</a:t>
             </a:r>
-            <a:endParaRPr b="0" lang="ru-RU" sz="2400" spc="-1" strike="noStrike">
-              <a:solidFill>
-                <a:srgbClr val="000000"/>
-              </a:solidFill>
-              <a:uFill>
-                <a:solidFill>
-                  <a:srgbClr val="ffffff"/>
-                </a:solidFill>
-              </a:uFill>
-              <a:latin typeface="Arial"/>
-              <a:ea typeface="Microsoft YaHei"/>
+            <a:endParaRPr b="0" lang="ru-RU" sz="1800" spc="-1" strike="noStrike">
+              <a:solidFill>
+                <a:srgbClr val="000000"/>
+              </a:solidFill>
+              <a:uFill>
+                <a:solidFill>
+                  <a:srgbClr val="ffffff"/>
+                </a:solidFill>
+              </a:uFill>
+              <a:latin typeface="Calibri"/>
             </a:endParaRPr>
           </a:p>
         </p:txBody>
@@ -4286,7 +4318,7 @@
         <p:spPr>
           <a:xfrm>
             <a:off x="504000" y="301320"/>
-            <a:ext cx="9071280" cy="1261800"/>
+            <a:ext cx="9070920" cy="1261440"/>
           </a:xfrm>
           <a:prstGeom prst="rect">
             <a:avLst/>
@@ -4311,7 +4343,7 @@
               </a:lnSpc>
             </a:pPr>
             <a:r>
-              <a:rPr b="0" lang="ru-RU" sz="4400" spc="-1" strike="noStrike">
+              <a:rPr b="1" lang="ru-RU" sz="4400" spc="-1" strike="noStrike">
                 <a:solidFill>
                   <a:srgbClr val="000000"/>
                 </a:solidFill>
@@ -4321,10 +4353,11 @@
                   </a:solidFill>
                 </a:uFill>
                 <a:latin typeface="Trebuchet MS"/>
+                <a:ea typeface="DejaVu Sans"/>
               </a:rPr>
               <a:t>Технологии</a:t>
             </a:r>
-            <a:endParaRPr b="0" lang="ru-RU" sz="1800" spc="-1" strike="noStrike">
+            <a:endParaRPr b="1" lang="ru-RU" sz="1800" spc="-1" strike="noStrike">
               <a:solidFill>
                 <a:srgbClr val="000000"/>
               </a:solidFill>
@@ -4347,7 +4380,7 @@
         <p:spPr>
           <a:xfrm>
             <a:off x="504000" y="1769040"/>
-            <a:ext cx="9071280" cy="4384080"/>
+            <a:ext cx="9070920" cy="4383720"/>
           </a:xfrm>
           <a:prstGeom prst="rect">
             <a:avLst/>
@@ -4363,6 +4396,232 @@
           <a:effectRef idx="0"/>
           <a:fontRef idx="minor"/>
         </p:style>
+      </p:sp>
+      <p:sp>
+        <p:nvSpPr>
+          <p:cNvPr id="79" name="TextShape 3"/>
+          <p:cNvSpPr txBox="1"/>
+          <p:nvPr/>
+        </p:nvSpPr>
+        <p:spPr>
+          <a:xfrm>
+            <a:off x="864000" y="2232000"/>
+            <a:ext cx="8496000" cy="3065400"/>
+          </a:xfrm>
+          <a:prstGeom prst="rect">
+            <a:avLst/>
+          </a:prstGeom>
+          <a:noFill/>
+          <a:ln>
+            <a:noFill/>
+          </a:ln>
+        </p:spPr>
+        <p:txBody>
+          <a:bodyPr lIns="90000" rIns="90000" tIns="45000" bIns="45000"/>
+          <a:p>
+            <a:r>
+              <a:rPr b="0" lang="ru-RU" sz="2400" spc="-1" strike="noStrike">
+                <a:solidFill>
+                  <a:srgbClr val="000000"/>
+                </a:solidFill>
+                <a:uFill>
+                  <a:solidFill>
+                    <a:srgbClr val="ffffff"/>
+                  </a:solidFill>
+                </a:uFill>
+                <a:latin typeface="Calibri"/>
+              </a:rPr>
+              <a:t>Язык: </a:t>
+            </a:r>
+            <a:r>
+              <a:rPr b="0" i="1" lang="ru-RU" sz="2400" spc="-1" strike="noStrike">
+                <a:solidFill>
+                  <a:srgbClr val="000000"/>
+                </a:solidFill>
+                <a:uFill>
+                  <a:solidFill>
+                    <a:srgbClr val="ffffff"/>
+                  </a:solidFill>
+                </a:uFill>
+                <a:latin typeface="Calibri"/>
+              </a:rPr>
+              <a:t>C++</a:t>
+            </a:r>
+            <a:endParaRPr b="0" lang="ru-RU" sz="2400" spc="-1" strike="noStrike">
+              <a:solidFill>
+                <a:srgbClr val="000000"/>
+              </a:solidFill>
+              <a:uFill>
+                <a:solidFill>
+                  <a:srgbClr val="ffffff"/>
+                </a:solidFill>
+              </a:uFill>
+              <a:latin typeface="Calibri"/>
+            </a:endParaRPr>
+          </a:p>
+          <a:p>
+            <a:endParaRPr b="0" lang="ru-RU" sz="2400" spc="-1" strike="noStrike">
+              <a:solidFill>
+                <a:srgbClr val="000000"/>
+              </a:solidFill>
+              <a:uFill>
+                <a:solidFill>
+                  <a:srgbClr val="ffffff"/>
+                </a:solidFill>
+              </a:uFill>
+              <a:latin typeface="Calibri"/>
+            </a:endParaRPr>
+          </a:p>
+          <a:p>
+            <a:r>
+              <a:rPr b="0" lang="ru-RU" sz="2400" spc="-1" strike="noStrike">
+                <a:solidFill>
+                  <a:srgbClr val="000000"/>
+                </a:solidFill>
+                <a:uFill>
+                  <a:solidFill>
+                    <a:srgbClr val="ffffff"/>
+                  </a:solidFill>
+                </a:uFill>
+                <a:latin typeface="Calibri"/>
+              </a:rPr>
+              <a:t>IDE: </a:t>
+            </a:r>
+            <a:r>
+              <a:rPr b="0" i="1" lang="ru-RU" sz="2400" spc="-1" strike="noStrike">
+                <a:solidFill>
+                  <a:srgbClr val="000000"/>
+                </a:solidFill>
+                <a:uFill>
+                  <a:solidFill>
+                    <a:srgbClr val="ffffff"/>
+                  </a:solidFill>
+                </a:uFill>
+                <a:latin typeface="Calibri"/>
+              </a:rPr>
+              <a:t>QtCreator 5</a:t>
+            </a:r>
+            <a:endParaRPr b="0" lang="ru-RU" sz="2400" spc="-1" strike="noStrike">
+              <a:solidFill>
+                <a:srgbClr val="000000"/>
+              </a:solidFill>
+              <a:uFill>
+                <a:solidFill>
+                  <a:srgbClr val="ffffff"/>
+                </a:solidFill>
+              </a:uFill>
+              <a:latin typeface="Calibri"/>
+            </a:endParaRPr>
+          </a:p>
+          <a:p>
+            <a:endParaRPr b="0" lang="ru-RU" sz="2400" spc="-1" strike="noStrike">
+              <a:solidFill>
+                <a:srgbClr val="000000"/>
+              </a:solidFill>
+              <a:uFill>
+                <a:solidFill>
+                  <a:srgbClr val="ffffff"/>
+                </a:solidFill>
+              </a:uFill>
+              <a:latin typeface="Calibri"/>
+            </a:endParaRPr>
+          </a:p>
+          <a:p>
+            <a:r>
+              <a:rPr b="0" lang="ru-RU" sz="2400" spc="-1" strike="noStrike">
+                <a:solidFill>
+                  <a:srgbClr val="000000"/>
+                </a:solidFill>
+                <a:uFill>
+                  <a:solidFill>
+                    <a:srgbClr val="ffffff"/>
+                  </a:solidFill>
+                </a:uFill>
+                <a:latin typeface="Calibri"/>
+              </a:rPr>
+              <a:t>Дополнительные библиотеки: </a:t>
+            </a:r>
+            <a:r>
+              <a:rPr b="0" i="1" lang="ru-RU" sz="2400" spc="-1" strike="noStrike">
+                <a:solidFill>
+                  <a:srgbClr val="000000"/>
+                </a:solidFill>
+                <a:uFill>
+                  <a:solidFill>
+                    <a:srgbClr val="ffffff"/>
+                  </a:solidFill>
+                </a:uFill>
+                <a:latin typeface="Calibri"/>
+              </a:rPr>
+              <a:t>TinyXML (для более удобного чтения XML-файлов)</a:t>
+            </a:r>
+            <a:endParaRPr b="0" lang="ru-RU" sz="2400" spc="-1" strike="noStrike">
+              <a:solidFill>
+                <a:srgbClr val="000000"/>
+              </a:solidFill>
+              <a:uFill>
+                <a:solidFill>
+                  <a:srgbClr val="ffffff"/>
+                </a:solidFill>
+              </a:uFill>
+              <a:latin typeface="Calibri"/>
+            </a:endParaRPr>
+          </a:p>
+          <a:p>
+            <a:endParaRPr b="0" lang="ru-RU" sz="2400" spc="-1" strike="noStrike">
+              <a:solidFill>
+                <a:srgbClr val="000000"/>
+              </a:solidFill>
+              <a:uFill>
+                <a:solidFill>
+                  <a:srgbClr val="ffffff"/>
+                </a:solidFill>
+              </a:uFill>
+              <a:latin typeface="Calibri"/>
+            </a:endParaRPr>
+          </a:p>
+          <a:p>
+            <a:r>
+              <a:rPr b="0" lang="ru-RU" sz="2400" spc="-1" strike="noStrike">
+                <a:solidFill>
+                  <a:srgbClr val="000000"/>
+                </a:solidFill>
+                <a:uFill>
+                  <a:solidFill>
+                    <a:srgbClr val="ffffff"/>
+                  </a:solidFill>
+                </a:uFill>
+                <a:latin typeface="Calibri"/>
+              </a:rPr>
+              <a:t>Компилятор: </a:t>
+            </a:r>
+            <a:r>
+              <a:rPr b="0" i="1" lang="ru-RU" sz="2400" spc="-1" strike="noStrike">
+                <a:solidFill>
+                  <a:srgbClr val="000000"/>
+                </a:solidFill>
+                <a:uFill>
+                  <a:solidFill>
+                    <a:srgbClr val="ffffff"/>
+                  </a:solidFill>
+                </a:uFill>
+                <a:latin typeface="Calibri"/>
+              </a:rPr>
+              <a:t>MinGW 4.9 (+ qmake)</a:t>
+            </a:r>
+            <a:endParaRPr b="0" lang="ru-RU" sz="2400" spc="-1" strike="noStrike">
+              <a:solidFill>
+                <a:srgbClr val="000000"/>
+              </a:solidFill>
+              <a:uFill>
+                <a:solidFill>
+                  <a:srgbClr val="ffffff"/>
+                </a:solidFill>
+              </a:uFill>
+              <a:latin typeface="Calibri"/>
+            </a:endParaRPr>
+          </a:p>
+        </p:txBody>
       </p:sp>
     </p:spTree>
   </p:cSld>
@@ -4415,14 +4674,14 @@
       </p:grpSpPr>
       <p:sp>
         <p:nvSpPr>
-          <p:cNvPr id="79" name="CustomShape 1"/>
+          <p:cNvPr id="80" name="CustomShape 1"/>
           <p:cNvSpPr/>
           <p:nvPr/>
         </p:nvSpPr>
         <p:spPr>
           <a:xfrm>
             <a:off x="504000" y="301320"/>
-            <a:ext cx="9071280" cy="1261800"/>
+            <a:ext cx="9070920" cy="1261440"/>
           </a:xfrm>
           <a:prstGeom prst="rect">
             <a:avLst/>
@@ -4447,7 +4706,7 @@
               </a:lnSpc>
             </a:pPr>
             <a:r>
-              <a:rPr b="0" lang="ru-RU" sz="4400" spc="-1" strike="noStrike">
+              <a:rPr b="1" lang="ru-RU" sz="4400" spc="-1" strike="noStrike">
                 <a:solidFill>
                   <a:srgbClr val="000000"/>
                 </a:solidFill>
@@ -4457,33 +4716,34 @@
                   </a:solidFill>
                 </a:uFill>
                 <a:latin typeface="Trebuchet MS"/>
+                <a:ea typeface="DejaVu Sans"/>
               </a:rPr>
               <a:t>Основные требования</a:t>
             </a:r>
-            <a:endParaRPr b="0" lang="ru-RU" sz="1800" spc="-1" strike="noStrike">
-              <a:solidFill>
-                <a:srgbClr val="000000"/>
-              </a:solidFill>
-              <a:uFill>
-                <a:solidFill>
-                  <a:srgbClr val="ffffff"/>
-                </a:solidFill>
-              </a:uFill>
-              <a:latin typeface="Arial"/>
-            </a:endParaRPr>
-          </a:p>
-        </p:txBody>
-      </p:sp>
-      <p:sp>
-        <p:nvSpPr>
-          <p:cNvPr id="80" name="CustomShape 2"/>
+            <a:endParaRPr b="1" lang="ru-RU" sz="1800" spc="-1" strike="noStrike">
+              <a:solidFill>
+                <a:srgbClr val="000000"/>
+              </a:solidFill>
+              <a:uFill>
+                <a:solidFill>
+                  <a:srgbClr val="ffffff"/>
+                </a:solidFill>
+              </a:uFill>
+              <a:latin typeface="Arial"/>
+            </a:endParaRPr>
+          </a:p>
+        </p:txBody>
+      </p:sp>
+      <p:sp>
+        <p:nvSpPr>
+          <p:cNvPr id="81" name="CustomShape 2"/>
           <p:cNvSpPr/>
           <p:nvPr/>
         </p:nvSpPr>
         <p:spPr>
           <a:xfrm>
-            <a:off x="504000" y="1769040"/>
-            <a:ext cx="9071280" cy="4384080"/>
+            <a:off x="504000" y="1808280"/>
+            <a:ext cx="9070920" cy="4383720"/>
           </a:xfrm>
           <a:prstGeom prst="rect">
             <a:avLst/>
@@ -4499,6 +4759,409 @@
           <a:effectRef idx="0"/>
           <a:fontRef idx="minor"/>
         </p:style>
+      </p:sp>
+      <p:sp>
+        <p:nvSpPr>
+          <p:cNvPr id="82" name="TextShape 3"/>
+          <p:cNvSpPr txBox="1"/>
+          <p:nvPr/>
+        </p:nvSpPr>
+        <p:spPr>
+          <a:xfrm>
+            <a:off x="691560" y="1808280"/>
+            <a:ext cx="8740440" cy="4968720"/>
+          </a:xfrm>
+          <a:prstGeom prst="rect">
+            <a:avLst/>
+          </a:prstGeom>
+          <a:noFill/>
+          <a:ln>
+            <a:noFill/>
+          </a:ln>
+        </p:spPr>
+        <p:txBody>
+          <a:bodyPr lIns="90000" rIns="90000" tIns="45000" bIns="45000"/>
+          <a:p>
+            <a:pPr marL="216000" indent="-216000">
+              <a:lnSpc>
+                <a:spcPct val="100000"/>
+              </a:lnSpc>
+              <a:buClr>
+                <a:srgbClr val="000000"/>
+              </a:buClr>
+              <a:buSzPct val="45000"/>
+              <a:buFont typeface="Wingdings" charset="2"/>
+              <a:buChar char=""/>
+            </a:pPr>
+            <a:r>
+              <a:rPr b="0" lang="ru-RU" sz="2400" spc="-1" strike="noStrike">
+                <a:solidFill>
+                  <a:srgbClr val="000000"/>
+                </a:solidFill>
+                <a:uFill>
+                  <a:solidFill>
+                    <a:srgbClr val="ffffff"/>
+                  </a:solidFill>
+                </a:uFill>
+                <a:latin typeface="Calibri"/>
+              </a:rPr>
+              <a:t>Проект компилируется и работает</a:t>
+            </a:r>
+            <a:endParaRPr b="0" lang="ru-RU" sz="2400" spc="-1" strike="noStrike">
+              <a:solidFill>
+                <a:srgbClr val="000000"/>
+              </a:solidFill>
+              <a:uFill>
+                <a:solidFill>
+                  <a:srgbClr val="ffffff"/>
+                </a:solidFill>
+              </a:uFill>
+              <a:latin typeface="Calibri"/>
+            </a:endParaRPr>
+          </a:p>
+          <a:p>
+            <a:pPr marL="216000" indent="-216000">
+              <a:lnSpc>
+                <a:spcPct val="100000"/>
+              </a:lnSpc>
+              <a:buClr>
+                <a:srgbClr val="000000"/>
+              </a:buClr>
+              <a:buSzPct val="45000"/>
+              <a:buFont typeface="Wingdings" charset="2"/>
+              <a:buChar char=""/>
+            </a:pPr>
+            <a:r>
+              <a:rPr b="0" lang="ru-RU" sz="2400" spc="-1" strike="noStrike">
+                <a:solidFill>
+                  <a:srgbClr val="000000"/>
+                </a:solidFill>
+                <a:uFill>
+                  <a:solidFill>
+                    <a:srgbClr val="ffffff"/>
+                  </a:solidFill>
+                </a:uFill>
+                <a:latin typeface="Calibri"/>
+              </a:rPr>
+              <a:t>Проект открывает XML-файл и считывает из него карту</a:t>
+            </a:r>
+            <a:endParaRPr b="0" lang="ru-RU" sz="2400" spc="-1" strike="noStrike">
+              <a:solidFill>
+                <a:srgbClr val="000000"/>
+              </a:solidFill>
+              <a:uFill>
+                <a:solidFill>
+                  <a:srgbClr val="ffffff"/>
+                </a:solidFill>
+              </a:uFill>
+              <a:latin typeface="Calibri"/>
+            </a:endParaRPr>
+          </a:p>
+          <a:p>
+            <a:pPr marL="216000" indent="-216000">
+              <a:lnSpc>
+                <a:spcPct val="100000"/>
+              </a:lnSpc>
+              <a:buClr>
+                <a:srgbClr val="000000"/>
+              </a:buClr>
+              <a:buSzPct val="45000"/>
+              <a:buFont typeface="Wingdings" charset="2"/>
+              <a:buChar char=""/>
+            </a:pPr>
+            <a:r>
+              <a:rPr b="0" lang="ru-RU" sz="2400" spc="-1" strike="noStrike">
+                <a:solidFill>
+                  <a:srgbClr val="000000"/>
+                </a:solidFill>
+                <a:uFill>
+                  <a:solidFill>
+                    <a:srgbClr val="ffffff"/>
+                  </a:solidFill>
+                </a:uFill>
+                <a:latin typeface="Calibri"/>
+              </a:rPr>
+              <a:t>В случае ошибки выдаются читаемые сообщения об ошибке</a:t>
+            </a:r>
+            <a:endParaRPr b="0" lang="ru-RU" sz="2400" spc="-1" strike="noStrike">
+              <a:solidFill>
+                <a:srgbClr val="000000"/>
+              </a:solidFill>
+              <a:uFill>
+                <a:solidFill>
+                  <a:srgbClr val="ffffff"/>
+                </a:solidFill>
+              </a:uFill>
+              <a:latin typeface="Calibri"/>
+            </a:endParaRPr>
+          </a:p>
+          <a:p>
+            <a:pPr marL="216000" indent="-216000">
+              <a:lnSpc>
+                <a:spcPct val="100000"/>
+              </a:lnSpc>
+              <a:buClr>
+                <a:srgbClr val="000000"/>
+              </a:buClr>
+              <a:buSzPct val="45000"/>
+              <a:buFont typeface="Wingdings" charset="2"/>
+              <a:buChar char=""/>
+            </a:pPr>
+            <a:r>
+              <a:rPr b="0" lang="ru-RU" sz="2400" spc="-1" strike="noStrike">
+                <a:solidFill>
+                  <a:srgbClr val="000000"/>
+                </a:solidFill>
+                <a:uFill>
+                  <a:solidFill>
+                    <a:srgbClr val="ffffff"/>
+                  </a:solidFill>
+                </a:uFill>
+                <a:latin typeface="Calibri"/>
+              </a:rPr>
+              <a:t>Программа считает следующие численные характеристики карты:</a:t>
+            </a:r>
+            <a:endParaRPr b="0" lang="ru-RU" sz="2400" spc="-1" strike="noStrike">
+              <a:solidFill>
+                <a:srgbClr val="000000"/>
+              </a:solidFill>
+              <a:uFill>
+                <a:solidFill>
+                  <a:srgbClr val="ffffff"/>
+                </a:solidFill>
+              </a:uFill>
+              <a:latin typeface="Calibri"/>
+            </a:endParaRPr>
+          </a:p>
+          <a:p>
+            <a:pPr lvl="2" marL="648000" indent="-216000">
+              <a:lnSpc>
+                <a:spcPct val="100000"/>
+              </a:lnSpc>
+              <a:buClr>
+                <a:srgbClr val="000000"/>
+              </a:buClr>
+              <a:buSzPct val="45000"/>
+              <a:buFont typeface="Wingdings" charset="2"/>
+              <a:buChar char=""/>
+            </a:pPr>
+            <a:r>
+              <a:rPr b="0" lang="ru-RU" sz="2000" spc="-1" strike="noStrike">
+                <a:solidFill>
+                  <a:srgbClr val="000000"/>
+                </a:solidFill>
+                <a:uFill>
+                  <a:solidFill>
+                    <a:srgbClr val="ffffff"/>
+                  </a:solidFill>
+                </a:uFill>
+                <a:latin typeface="Calibri"/>
+              </a:rPr>
+              <a:t>Количество препятствий</a:t>
+            </a:r>
+            <a:endParaRPr b="0" lang="ru-RU" sz="2400" spc="-1" strike="noStrike">
+              <a:solidFill>
+                <a:srgbClr val="000000"/>
+              </a:solidFill>
+              <a:uFill>
+                <a:solidFill>
+                  <a:srgbClr val="ffffff"/>
+                </a:solidFill>
+              </a:uFill>
+              <a:latin typeface="Calibri"/>
+            </a:endParaRPr>
+          </a:p>
+          <a:p>
+            <a:pPr lvl="2" marL="648000" indent="-216000">
+              <a:lnSpc>
+                <a:spcPct val="100000"/>
+              </a:lnSpc>
+              <a:buClr>
+                <a:srgbClr val="000000"/>
+              </a:buClr>
+              <a:buSzPct val="45000"/>
+              <a:buFont typeface="Wingdings" charset="2"/>
+              <a:buChar char=""/>
+            </a:pPr>
+            <a:r>
+              <a:rPr b="0" lang="ru-RU" sz="2000" spc="-1" strike="noStrike">
+                <a:solidFill>
+                  <a:srgbClr val="000000"/>
+                </a:solidFill>
+                <a:uFill>
+                  <a:solidFill>
+                    <a:srgbClr val="ffffff"/>
+                  </a:solidFill>
+                </a:uFill>
+                <a:latin typeface="Calibri"/>
+              </a:rPr>
+              <a:t>Общие площадь и периметр препятствий</a:t>
+            </a:r>
+            <a:endParaRPr b="0" lang="ru-RU" sz="2400" spc="-1" strike="noStrike">
+              <a:solidFill>
+                <a:srgbClr val="000000"/>
+              </a:solidFill>
+              <a:uFill>
+                <a:solidFill>
+                  <a:srgbClr val="ffffff"/>
+                </a:solidFill>
+              </a:uFill>
+              <a:latin typeface="Calibri"/>
+            </a:endParaRPr>
+          </a:p>
+          <a:p>
+            <a:pPr lvl="2" marL="648000" indent="-216000">
+              <a:lnSpc>
+                <a:spcPct val="100000"/>
+              </a:lnSpc>
+              <a:buClr>
+                <a:srgbClr val="000000"/>
+              </a:buClr>
+              <a:buSzPct val="45000"/>
+              <a:buFont typeface="Wingdings" charset="2"/>
+              <a:buChar char=""/>
+            </a:pPr>
+            <a:r>
+              <a:rPr b="0" lang="ru-RU" sz="2000" spc="-1" strike="noStrike">
+                <a:solidFill>
+                  <a:srgbClr val="000000"/>
+                </a:solidFill>
+                <a:uFill>
+                  <a:solidFill>
+                    <a:srgbClr val="ffffff"/>
+                  </a:solidFill>
+                </a:uFill>
+                <a:latin typeface="Calibri"/>
+              </a:rPr>
+              <a:t>Среднюю площадь и периметр препятствий</a:t>
+            </a:r>
+            <a:endParaRPr b="0" lang="ru-RU" sz="2400" spc="-1" strike="noStrike">
+              <a:solidFill>
+                <a:srgbClr val="000000"/>
+              </a:solidFill>
+              <a:uFill>
+                <a:solidFill>
+                  <a:srgbClr val="ffffff"/>
+                </a:solidFill>
+              </a:uFill>
+              <a:latin typeface="Calibri"/>
+            </a:endParaRPr>
+          </a:p>
+          <a:p>
+            <a:pPr lvl="2" marL="648000" indent="-216000">
+              <a:lnSpc>
+                <a:spcPct val="100000"/>
+              </a:lnSpc>
+              <a:buClr>
+                <a:srgbClr val="000000"/>
+              </a:buClr>
+              <a:buSzPct val="45000"/>
+              <a:buFont typeface="Wingdings" charset="2"/>
+              <a:buChar char=""/>
+            </a:pPr>
+            <a:r>
+              <a:rPr b="0" lang="ru-RU" sz="2000" spc="-1" strike="noStrike">
+                <a:solidFill>
+                  <a:srgbClr val="000000"/>
+                </a:solidFill>
+                <a:uFill>
+                  <a:solidFill>
+                    <a:srgbClr val="ffffff"/>
+                  </a:solidFill>
+                </a:uFill>
+                <a:latin typeface="Calibri"/>
+              </a:rPr>
+              <a:t>Дисперсию площадей и периметров препятствий</a:t>
+            </a:r>
+            <a:endParaRPr b="0" lang="ru-RU" sz="2400" spc="-1" strike="noStrike">
+              <a:solidFill>
+                <a:srgbClr val="000000"/>
+              </a:solidFill>
+              <a:uFill>
+                <a:solidFill>
+                  <a:srgbClr val="ffffff"/>
+                </a:solidFill>
+              </a:uFill>
+              <a:latin typeface="Calibri"/>
+            </a:endParaRPr>
+          </a:p>
+          <a:p>
+            <a:pPr lvl="2" marL="648000" indent="-216000">
+              <a:lnSpc>
+                <a:spcPct val="100000"/>
+              </a:lnSpc>
+              <a:buClr>
+                <a:srgbClr val="000000"/>
+              </a:buClr>
+              <a:buSzPct val="45000"/>
+              <a:buFont typeface="Wingdings" charset="2"/>
+              <a:buChar char=""/>
+            </a:pPr>
+            <a:r>
+              <a:rPr b="0" lang="ru-RU" sz="2000" spc="-1" strike="noStrike">
+                <a:solidFill>
+                  <a:srgbClr val="000000"/>
+                </a:solidFill>
+                <a:uFill>
+                  <a:solidFill>
+                    <a:srgbClr val="ffffff"/>
+                  </a:solidFill>
+                </a:uFill>
+                <a:latin typeface="Calibri"/>
+              </a:rPr>
+              <a:t>Доля карты, занятая препятствиями</a:t>
+            </a:r>
+            <a:endParaRPr b="0" lang="ru-RU" sz="2400" spc="-1" strike="noStrike">
+              <a:solidFill>
+                <a:srgbClr val="000000"/>
+              </a:solidFill>
+              <a:uFill>
+                <a:solidFill>
+                  <a:srgbClr val="ffffff"/>
+                </a:solidFill>
+              </a:uFill>
+              <a:latin typeface="Calibri"/>
+            </a:endParaRPr>
+          </a:p>
+          <a:p>
+            <a:pPr marL="216000" indent="-216000">
+              <a:lnSpc>
+                <a:spcPct val="100000"/>
+              </a:lnSpc>
+              <a:buClr>
+                <a:srgbClr val="000000"/>
+              </a:buClr>
+              <a:buSzPct val="45000"/>
+              <a:buFont typeface="Wingdings" charset="2"/>
+              <a:buChar char=""/>
+            </a:pPr>
+            <a:r>
+              <a:rPr b="0" lang="ru-RU" sz="2400" spc="-1" strike="noStrike">
+                <a:solidFill>
+                  <a:srgbClr val="000000"/>
+                </a:solidFill>
+                <a:uFill>
+                  <a:solidFill>
+                    <a:srgbClr val="ffffff"/>
+                  </a:solidFill>
+                </a:uFill>
+                <a:latin typeface="Calibri"/>
+              </a:rPr>
+              <a:t>Программа выводит результаты анализа карты вместе с самой картой по обговоренному стандарту</a:t>
+            </a:r>
+            <a:endParaRPr b="0" lang="ru-RU" sz="2400" spc="-1" strike="noStrike">
+              <a:solidFill>
+                <a:srgbClr val="000000"/>
+              </a:solidFill>
+              <a:uFill>
+                <a:solidFill>
+                  <a:srgbClr val="ffffff"/>
+                </a:solidFill>
+              </a:uFill>
+              <a:latin typeface="Calibri"/>
+            </a:endParaRPr>
+          </a:p>
+        </p:txBody>
       </p:sp>
     </p:spTree>
   </p:cSld>
@@ -4551,14 +5214,14 @@
       </p:grpSpPr>
       <p:sp>
         <p:nvSpPr>
-          <p:cNvPr id="81" name="CustomShape 1"/>
+          <p:cNvPr id="83" name="CustomShape 1"/>
           <p:cNvSpPr/>
           <p:nvPr/>
         </p:nvSpPr>
         <p:spPr>
           <a:xfrm>
             <a:off x="504000" y="301320"/>
-            <a:ext cx="9071280" cy="1261800"/>
+            <a:ext cx="9070920" cy="1261440"/>
           </a:xfrm>
           <a:prstGeom prst="rect">
             <a:avLst/>
@@ -4583,7 +5246,7 @@
               </a:lnSpc>
             </a:pPr>
             <a:r>
-              <a:rPr b="0" lang="ru-RU" sz="4400" spc="-1" strike="noStrike">
+              <a:rPr b="1" lang="ru-RU" sz="4400" spc="-1" strike="noStrike">
                 <a:solidFill>
                   <a:srgbClr val="000000"/>
                 </a:solidFill>
@@ -4593,33 +5256,34 @@
                   </a:solidFill>
                 </a:uFill>
                 <a:latin typeface="Trebuchet MS"/>
+                <a:ea typeface="DejaVu Sans"/>
               </a:rPr>
               <a:t>Ход реализации</a:t>
             </a:r>
-            <a:endParaRPr b="0" lang="ru-RU" sz="1800" spc="-1" strike="noStrike">
-              <a:solidFill>
-                <a:srgbClr val="000000"/>
-              </a:solidFill>
-              <a:uFill>
-                <a:solidFill>
-                  <a:srgbClr val="ffffff"/>
-                </a:solidFill>
-              </a:uFill>
-              <a:latin typeface="Arial"/>
-            </a:endParaRPr>
-          </a:p>
-        </p:txBody>
-      </p:sp>
-      <p:sp>
-        <p:nvSpPr>
-          <p:cNvPr id="82" name="CustomShape 2"/>
+            <a:endParaRPr b="1" lang="ru-RU" sz="1800" spc="-1" strike="noStrike">
+              <a:solidFill>
+                <a:srgbClr val="000000"/>
+              </a:solidFill>
+              <a:uFill>
+                <a:solidFill>
+                  <a:srgbClr val="ffffff"/>
+                </a:solidFill>
+              </a:uFill>
+              <a:latin typeface="Arial"/>
+            </a:endParaRPr>
+          </a:p>
+        </p:txBody>
+      </p:sp>
+      <p:sp>
+        <p:nvSpPr>
+          <p:cNvPr id="84" name="CustomShape 2"/>
           <p:cNvSpPr/>
           <p:nvPr/>
         </p:nvSpPr>
         <p:spPr>
           <a:xfrm>
             <a:off x="504000" y="1769040"/>
-            <a:ext cx="9071280" cy="4384080"/>
+            <a:ext cx="9070920" cy="4383720"/>
           </a:xfrm>
           <a:prstGeom prst="rect">
             <a:avLst/>
@@ -4687,14 +5351,14 @@
       </p:grpSpPr>
       <p:sp>
         <p:nvSpPr>
-          <p:cNvPr id="83" name="CustomShape 1"/>
+          <p:cNvPr id="85" name="CustomShape 1"/>
           <p:cNvSpPr/>
           <p:nvPr/>
         </p:nvSpPr>
         <p:spPr>
           <a:xfrm>
             <a:off x="504000" y="301320"/>
-            <a:ext cx="9071280" cy="1261800"/>
+            <a:ext cx="9070920" cy="1261440"/>
           </a:xfrm>
           <a:prstGeom prst="rect">
             <a:avLst/>
@@ -4719,7 +5383,7 @@
               </a:lnSpc>
             </a:pPr>
             <a:r>
-              <a:rPr b="0" lang="ru-RU" sz="4400" spc="-1" strike="noStrike">
+              <a:rPr b="1" lang="ru-RU" sz="4400" spc="-1" strike="noStrike">
                 <a:solidFill>
                   <a:srgbClr val="000000"/>
                 </a:solidFill>
@@ -4729,33 +5393,34 @@
                   </a:solidFill>
                 </a:uFill>
                 <a:latin typeface="Trebuchet MS"/>
+                <a:ea typeface="DejaVu Sans"/>
               </a:rPr>
               <a:t>Результат</a:t>
             </a:r>
-            <a:endParaRPr b="0" lang="ru-RU" sz="1800" spc="-1" strike="noStrike">
-              <a:solidFill>
-                <a:srgbClr val="000000"/>
-              </a:solidFill>
-              <a:uFill>
-                <a:solidFill>
-                  <a:srgbClr val="ffffff"/>
-                </a:solidFill>
-              </a:uFill>
-              <a:latin typeface="Arial"/>
-            </a:endParaRPr>
-          </a:p>
-        </p:txBody>
-      </p:sp>
-      <p:sp>
-        <p:nvSpPr>
-          <p:cNvPr id="84" name="CustomShape 2"/>
+            <a:endParaRPr b="1" lang="ru-RU" sz="1800" spc="-1" strike="noStrike">
+              <a:solidFill>
+                <a:srgbClr val="000000"/>
+              </a:solidFill>
+              <a:uFill>
+                <a:solidFill>
+                  <a:srgbClr val="ffffff"/>
+                </a:solidFill>
+              </a:uFill>
+              <a:latin typeface="Arial"/>
+            </a:endParaRPr>
+          </a:p>
+        </p:txBody>
+      </p:sp>
+      <p:sp>
+        <p:nvSpPr>
+          <p:cNvPr id="86" name="CustomShape 2"/>
           <p:cNvSpPr/>
           <p:nvPr/>
         </p:nvSpPr>
         <p:spPr>
           <a:xfrm>
             <a:off x="504000" y="1769040"/>
-            <a:ext cx="9071280" cy="4384080"/>
+            <a:ext cx="9070920" cy="4383720"/>
           </a:xfrm>
           <a:prstGeom prst="rect">
             <a:avLst/>

</xml_diff>